<commit_message>
fix NN screenshot wrong
</commit_message>
<xml_diff>
--- a/1-NN/手算神經網路/Presentation.pptx
+++ b/1-NN/手算神經網路/Presentation.pptx
@@ -108,6 +108,11 @@
       </a:defRPr>
     </a:lvl9pPr>
   </p:defaultTextStyle>
+  <p:extLst>
+    <p:ext uri="{EFAFB233-063F-42B5-8137-9DF3F51BA10A}">
+      <p15:sldGuideLst xmlns:p15="http://schemas.microsoft.com/office/powerpoint/2012/main"/>
+    </p:ext>
+  </p:extLst>
 </p:presentation>
 </file>
 
@@ -258,7 +263,7 @@
           <a:p>
             <a:fld id="{29BBBEFA-F182-7B44-87E7-49DEF21ED0FF}" type="datetimeFigureOut">
               <a:rPr lang="en-US" smtClean="0"/>
-              <a:t>10/8/19</a:t>
+              <a:t>10/12/19</a:t>
             </a:fld>
             <a:endParaRPr lang="en-US"/>
           </a:p>
@@ -456,7 +461,7 @@
           <a:p>
             <a:fld id="{29BBBEFA-F182-7B44-87E7-49DEF21ED0FF}" type="datetimeFigureOut">
               <a:rPr lang="en-US" smtClean="0"/>
-              <a:t>10/8/19</a:t>
+              <a:t>10/12/19</a:t>
             </a:fld>
             <a:endParaRPr lang="en-US"/>
           </a:p>
@@ -664,7 +669,7 @@
           <a:p>
             <a:fld id="{29BBBEFA-F182-7B44-87E7-49DEF21ED0FF}" type="datetimeFigureOut">
               <a:rPr lang="en-US" smtClean="0"/>
-              <a:t>10/8/19</a:t>
+              <a:t>10/12/19</a:t>
             </a:fld>
             <a:endParaRPr lang="en-US"/>
           </a:p>
@@ -862,7 +867,7 @@
           <a:p>
             <a:fld id="{29BBBEFA-F182-7B44-87E7-49DEF21ED0FF}" type="datetimeFigureOut">
               <a:rPr lang="en-US" smtClean="0"/>
-              <a:t>10/8/19</a:t>
+              <a:t>10/12/19</a:t>
             </a:fld>
             <a:endParaRPr lang="en-US"/>
           </a:p>
@@ -1137,7 +1142,7 @@
           <a:p>
             <a:fld id="{29BBBEFA-F182-7B44-87E7-49DEF21ED0FF}" type="datetimeFigureOut">
               <a:rPr lang="en-US" smtClean="0"/>
-              <a:t>10/8/19</a:t>
+              <a:t>10/12/19</a:t>
             </a:fld>
             <a:endParaRPr lang="en-US"/>
           </a:p>
@@ -1402,7 +1407,7 @@
           <a:p>
             <a:fld id="{29BBBEFA-F182-7B44-87E7-49DEF21ED0FF}" type="datetimeFigureOut">
               <a:rPr lang="en-US" smtClean="0"/>
-              <a:t>10/8/19</a:t>
+              <a:t>10/12/19</a:t>
             </a:fld>
             <a:endParaRPr lang="en-US"/>
           </a:p>
@@ -1814,7 +1819,7 @@
           <a:p>
             <a:fld id="{29BBBEFA-F182-7B44-87E7-49DEF21ED0FF}" type="datetimeFigureOut">
               <a:rPr lang="en-US" smtClean="0"/>
-              <a:t>10/8/19</a:t>
+              <a:t>10/12/19</a:t>
             </a:fld>
             <a:endParaRPr lang="en-US"/>
           </a:p>
@@ -1955,7 +1960,7 @@
           <a:p>
             <a:fld id="{29BBBEFA-F182-7B44-87E7-49DEF21ED0FF}" type="datetimeFigureOut">
               <a:rPr lang="en-US" smtClean="0"/>
-              <a:t>10/8/19</a:t>
+              <a:t>10/12/19</a:t>
             </a:fld>
             <a:endParaRPr lang="en-US"/>
           </a:p>
@@ -2068,7 +2073,7 @@
           <a:p>
             <a:fld id="{29BBBEFA-F182-7B44-87E7-49DEF21ED0FF}" type="datetimeFigureOut">
               <a:rPr lang="en-US" smtClean="0"/>
-              <a:t>10/8/19</a:t>
+              <a:t>10/12/19</a:t>
             </a:fld>
             <a:endParaRPr lang="en-US"/>
           </a:p>
@@ -2379,7 +2384,7 @@
           <a:p>
             <a:fld id="{29BBBEFA-F182-7B44-87E7-49DEF21ED0FF}" type="datetimeFigureOut">
               <a:rPr lang="en-US" smtClean="0"/>
-              <a:t>10/8/19</a:t>
+              <a:t>10/12/19</a:t>
             </a:fld>
             <a:endParaRPr lang="en-US"/>
           </a:p>
@@ -2667,7 +2672,7 @@
           <a:p>
             <a:fld id="{29BBBEFA-F182-7B44-87E7-49DEF21ED0FF}" type="datetimeFigureOut">
               <a:rPr lang="en-US" smtClean="0"/>
-              <a:t>10/8/19</a:t>
+              <a:t>10/12/19</a:t>
             </a:fld>
             <a:endParaRPr lang="en-US"/>
           </a:p>
@@ -2908,7 +2913,7 @@
           <a:p>
             <a:fld id="{29BBBEFA-F182-7B44-87E7-49DEF21ED0FF}" type="datetimeFigureOut">
               <a:rPr lang="en-US" smtClean="0"/>
-              <a:t>10/8/19</a:t>
+              <a:t>10/12/19</a:t>
             </a:fld>
             <a:endParaRPr lang="en-US"/>
           </a:p>
@@ -3643,8 +3648,8 @@
           </a:p>
         </p:txBody>
       </p:sp>
-      <mc:AlternateContent xmlns:mc="http://schemas.openxmlformats.org/markup-compatibility/2006">
-        <mc:Choice xmlns:a14="http://schemas.microsoft.com/office/drawing/2010/main" Requires="a14">
+      <mc:AlternateContent xmlns:mc="http://schemas.openxmlformats.org/markup-compatibility/2006" xmlns:a14="http://schemas.microsoft.com/office/drawing/2010/main">
+        <mc:Choice Requires="a14">
           <p:sp>
             <p:nvSpPr>
               <p:cNvPr id="10" name="Oval 9">
@@ -3716,7 +3721,7 @@
             </p:txBody>
           </p:sp>
         </mc:Choice>
-        <mc:Fallback>
+        <mc:Fallback xmlns="">
           <p:sp>
             <p:nvSpPr>
               <p:cNvPr id="10" name="Oval 9">
@@ -4081,8 +4086,8 @@
           </a:fontRef>
         </p:style>
       </p:cxnSp>
-      <mc:AlternateContent xmlns:mc="http://schemas.openxmlformats.org/markup-compatibility/2006">
-        <mc:Choice xmlns:a14="http://schemas.microsoft.com/office/drawing/2010/main" Requires="a14">
+      <mc:AlternateContent xmlns:mc="http://schemas.openxmlformats.org/markup-compatibility/2006" xmlns:a14="http://schemas.microsoft.com/office/drawing/2010/main">
+        <mc:Choice Requires="a14">
           <p:sp>
             <p:nvSpPr>
               <p:cNvPr id="37" name="TextBox 36">
@@ -4111,7 +4116,6 @@
               </a:bodyPr>
               <a:lstStyle/>
               <a:p>
-                <a:pPr/>
                 <a:r>
                   <a:rPr lang="en-US" b="0" dirty="0">
                     <a:latin typeface="Cambria Math" panose="02040503050406030204" pitchFamily="18" charset="0"/>
@@ -4229,7 +4233,7 @@
             </p:txBody>
           </p:sp>
         </mc:Choice>
-        <mc:Fallback>
+        <mc:Fallback xmlns="">
           <p:sp>
             <p:nvSpPr>
               <p:cNvPr id="37" name="TextBox 36">
@@ -4274,8 +4278,8 @@
           </p:sp>
         </mc:Fallback>
       </mc:AlternateContent>
-      <mc:AlternateContent xmlns:mc="http://schemas.openxmlformats.org/markup-compatibility/2006">
-        <mc:Choice xmlns:a14="http://schemas.microsoft.com/office/drawing/2010/main" Requires="a14">
+      <mc:AlternateContent xmlns:mc="http://schemas.openxmlformats.org/markup-compatibility/2006" xmlns:a14="http://schemas.microsoft.com/office/drawing/2010/main">
+        <mc:Choice Requires="a14">
           <p:sp>
             <p:nvSpPr>
               <p:cNvPr id="38" name="Rectangle 37">
@@ -4303,6 +4307,7 @@
               </a:bodyPr>
               <a:lstStyle/>
               <a:p>
+                <a:pPr/>
                 <a14:m>
                   <m:oMathPara xmlns:m="http://schemas.openxmlformats.org/officeDocument/2006/math">
                     <m:oMathParaPr>
@@ -4330,7 +4335,7 @@
             </p:txBody>
           </p:sp>
         </mc:Choice>
-        <mc:Fallback>
+        <mc:Fallback xmlns="">
           <p:sp>
             <p:nvSpPr>
               <p:cNvPr id="38" name="Rectangle 37">
@@ -4375,8 +4380,8 @@
           </p:sp>
         </mc:Fallback>
       </mc:AlternateContent>
-      <mc:AlternateContent xmlns:mc="http://schemas.openxmlformats.org/markup-compatibility/2006">
-        <mc:Choice xmlns:a14="http://schemas.microsoft.com/office/drawing/2010/main" Requires="a14">
+      <mc:AlternateContent xmlns:mc="http://schemas.openxmlformats.org/markup-compatibility/2006" xmlns:a14="http://schemas.microsoft.com/office/drawing/2010/main">
+        <mc:Choice Requires="a14">
           <p:sp>
             <p:nvSpPr>
               <p:cNvPr id="39" name="Rectangle 38">
@@ -4404,6 +4409,7 @@
               </a:bodyPr>
               <a:lstStyle/>
               <a:p>
+                <a:pPr/>
                 <a14:m>
                   <m:oMathPara xmlns:m="http://schemas.openxmlformats.org/officeDocument/2006/math">
                     <m:oMathParaPr>
@@ -4431,7 +4437,7 @@
             </p:txBody>
           </p:sp>
         </mc:Choice>
-        <mc:Fallback>
+        <mc:Fallback xmlns="">
           <p:sp>
             <p:nvSpPr>
               <p:cNvPr id="39" name="Rectangle 38">
@@ -4476,8 +4482,8 @@
           </p:sp>
         </mc:Fallback>
       </mc:AlternateContent>
-      <mc:AlternateContent xmlns:mc="http://schemas.openxmlformats.org/markup-compatibility/2006">
-        <mc:Choice xmlns:a14="http://schemas.microsoft.com/office/drawing/2010/main" Requires="a14">
+      <mc:AlternateContent xmlns:mc="http://schemas.openxmlformats.org/markup-compatibility/2006" xmlns:a14="http://schemas.microsoft.com/office/drawing/2010/main">
+        <mc:Choice Requires="a14">
           <p:sp>
             <p:nvSpPr>
               <p:cNvPr id="40" name="Rectangle 39">
@@ -4505,6 +4511,7 @@
               </a:bodyPr>
               <a:lstStyle/>
               <a:p>
+                <a:pPr/>
                 <a14:m>
                   <m:oMathPara xmlns:m="http://schemas.openxmlformats.org/officeDocument/2006/math">
                     <m:oMathParaPr>
@@ -4525,7 +4532,7 @@
             </p:txBody>
           </p:sp>
         </mc:Choice>
-        <mc:Fallback>
+        <mc:Fallback xmlns="">
           <p:sp>
             <p:nvSpPr>
               <p:cNvPr id="40" name="Rectangle 39">
@@ -4570,8 +4577,8 @@
           </p:sp>
         </mc:Fallback>
       </mc:AlternateContent>
-      <mc:AlternateContent xmlns:mc="http://schemas.openxmlformats.org/markup-compatibility/2006">
-        <mc:Choice xmlns:a14="http://schemas.microsoft.com/office/drawing/2010/main" Requires="a14">
+      <mc:AlternateContent xmlns:mc="http://schemas.openxmlformats.org/markup-compatibility/2006" xmlns:a14="http://schemas.microsoft.com/office/drawing/2010/main">
+        <mc:Choice Requires="a14">
           <p:sp>
             <p:nvSpPr>
               <p:cNvPr id="41" name="Rectangle 40">
@@ -4599,6 +4606,7 @@
               </a:bodyPr>
               <a:lstStyle/>
               <a:p>
+                <a:pPr/>
                 <a14:m>
                   <m:oMathPara xmlns:m="http://schemas.openxmlformats.org/officeDocument/2006/math">
                     <m:oMathParaPr>
@@ -4625,7 +4633,7 @@
             </p:txBody>
           </p:sp>
         </mc:Choice>
-        <mc:Fallback>
+        <mc:Fallback xmlns="">
           <p:sp>
             <p:nvSpPr>
               <p:cNvPr id="41" name="Rectangle 40">
@@ -4670,8 +4678,8 @@
           </p:sp>
         </mc:Fallback>
       </mc:AlternateContent>
-      <mc:AlternateContent xmlns:mc="http://schemas.openxmlformats.org/markup-compatibility/2006">
-        <mc:Choice xmlns:a14="http://schemas.microsoft.com/office/drawing/2010/main" Requires="a14">
+      <mc:AlternateContent xmlns:mc="http://schemas.openxmlformats.org/markup-compatibility/2006" xmlns:a14="http://schemas.microsoft.com/office/drawing/2010/main">
+        <mc:Choice Requires="a14">
           <p:sp>
             <p:nvSpPr>
               <p:cNvPr id="42" name="Rectangle 41">
@@ -4699,6 +4707,7 @@
               </a:bodyPr>
               <a:lstStyle/>
               <a:p>
+                <a:pPr/>
                 <a14:m>
                   <m:oMathPara xmlns:m="http://schemas.openxmlformats.org/officeDocument/2006/math">
                     <m:oMathParaPr>
@@ -4725,7 +4734,7 @@
             </p:txBody>
           </p:sp>
         </mc:Choice>
-        <mc:Fallback>
+        <mc:Fallback xmlns="">
           <p:sp>
             <p:nvSpPr>
               <p:cNvPr id="42" name="Rectangle 41">
@@ -4770,8 +4779,8 @@
           </p:sp>
         </mc:Fallback>
       </mc:AlternateContent>
-      <mc:AlternateContent xmlns:mc="http://schemas.openxmlformats.org/markup-compatibility/2006">
-        <mc:Choice xmlns:a14="http://schemas.microsoft.com/office/drawing/2010/main" Requires="a14">
+      <mc:AlternateContent xmlns:mc="http://schemas.openxmlformats.org/markup-compatibility/2006" xmlns:a14="http://schemas.microsoft.com/office/drawing/2010/main">
+        <mc:Choice Requires="a14">
           <p:sp>
             <p:nvSpPr>
               <p:cNvPr id="43" name="Rectangle 42">
@@ -4900,7 +4909,7 @@
             </p:txBody>
           </p:sp>
         </mc:Choice>
-        <mc:Fallback>
+        <mc:Fallback xmlns="">
           <p:sp>
             <p:nvSpPr>
               <p:cNvPr id="43" name="Rectangle 42">
@@ -4962,7 +4971,7 @@
             <p:spPr>
               <a:xfrm>
                 <a:off x="1363007" y="4601595"/>
-                <a:ext cx="4738220" cy="369332"/>
+                <a:ext cx="4424032" cy="369332"/>
               </a:xfrm>
               <a:prstGeom prst="rect">
                 <a:avLst/>
@@ -5062,7 +5071,7 @@
                         <a:latin typeface="Cambria Math" panose="02040503050406030204" pitchFamily="18" charset="0"/>
                         <a:ea typeface="Cambria Math" panose="02040503050406030204" pitchFamily="18" charset="0"/>
                       </a:rPr>
-                      <m:t>=0.5，</m:t>
+                      <m:t>=1，</m:t>
                     </m:r>
                     <m:r>
                       <a:rPr lang="en-US" b="0" i="1" smtClean="0">
@@ -5106,7 +5115,7 @@
             <p:spPr>
               <a:xfrm>
                 <a:off x="1363007" y="4601595"/>
-                <a:ext cx="4738220" cy="369332"/>
+                <a:ext cx="4424032" cy="369332"/>
               </a:xfrm>
               <a:prstGeom prst="rect">
                 <a:avLst/>
@@ -5114,7 +5123,7 @@
               <a:blipFill>
                 <a:blip r:embed="rId10"/>
                 <a:stretch>
-                  <a:fillRect l="-802" t="-3333" b="-26667"/>
+                  <a:fillRect l="-857" t="-3333" b="-26667"/>
                 </a:stretch>
               </a:blipFill>
             </p:spPr>
@@ -5133,8 +5142,8 @@
           </p:sp>
         </mc:Fallback>
       </mc:AlternateContent>
-      <mc:AlternateContent xmlns:mc="http://schemas.openxmlformats.org/markup-compatibility/2006">
-        <mc:Choice xmlns:a14="http://schemas.microsoft.com/office/drawing/2010/main" Requires="a14">
+      <mc:AlternateContent xmlns:mc="http://schemas.openxmlformats.org/markup-compatibility/2006" xmlns:a14="http://schemas.microsoft.com/office/drawing/2010/main">
+        <mc:Choice Requires="a14">
           <p:sp>
             <p:nvSpPr>
               <p:cNvPr id="52" name="Rectangle 51">
@@ -5195,7 +5204,7 @@
             </p:txBody>
           </p:sp>
         </mc:Choice>
-        <mc:Fallback>
+        <mc:Fallback xmlns="">
           <p:sp>
             <p:nvSpPr>
               <p:cNvPr id="52" name="Rectangle 51">
@@ -5660,8 +5669,8 @@
           </a:p>
         </p:txBody>
       </p:sp>
-      <mc:AlternateContent xmlns:mc="http://schemas.openxmlformats.org/markup-compatibility/2006">
-        <mc:Choice xmlns:a14="http://schemas.microsoft.com/office/drawing/2010/main" Requires="a14">
+      <mc:AlternateContent xmlns:mc="http://schemas.openxmlformats.org/markup-compatibility/2006" xmlns:a14="http://schemas.microsoft.com/office/drawing/2010/main">
+        <mc:Choice Requires="a14">
           <p:sp>
             <p:nvSpPr>
               <p:cNvPr id="62" name="Rectangle 61">
@@ -6106,7 +6115,7 @@
             </p:txBody>
           </p:sp>
         </mc:Choice>
-        <mc:Fallback>
+        <mc:Fallback xmlns="">
           <p:sp>
             <p:nvSpPr>
               <p:cNvPr id="62" name="Rectangle 61">
@@ -6343,8 +6352,8 @@
           </a:fontRef>
         </p:style>
       </p:cxnSp>
-      <mc:AlternateContent xmlns:mc="http://schemas.openxmlformats.org/markup-compatibility/2006">
-        <mc:Choice xmlns:a14="http://schemas.microsoft.com/office/drawing/2010/main" Requires="a14">
+      <mc:AlternateContent xmlns:mc="http://schemas.openxmlformats.org/markup-compatibility/2006" xmlns:a14="http://schemas.microsoft.com/office/drawing/2010/main">
+        <mc:Choice Requires="a14">
           <p:sp>
             <p:nvSpPr>
               <p:cNvPr id="70" name="Rectangle 69">
@@ -6372,6 +6381,7 @@
               </a:bodyPr>
               <a:lstStyle/>
               <a:p>
+                <a:pPr/>
                 <a14:m>
                   <m:oMathPara xmlns:m="http://schemas.openxmlformats.org/officeDocument/2006/math">
                     <m:oMathParaPr>
@@ -6392,7 +6402,7 @@
             </p:txBody>
           </p:sp>
         </mc:Choice>
-        <mc:Fallback>
+        <mc:Fallback xmlns="">
           <p:sp>
             <p:nvSpPr>
               <p:cNvPr id="70" name="Rectangle 69">
@@ -6553,8 +6563,8 @@
           <a:chExt cx="0" cy="0"/>
         </a:xfrm>
       </p:grpSpPr>
-      <mc:AlternateContent xmlns:mc="http://schemas.openxmlformats.org/markup-compatibility/2006">
-        <mc:Choice xmlns:a14="http://schemas.microsoft.com/office/drawing/2010/main" Requires="a14">
+      <mc:AlternateContent xmlns:mc="http://schemas.openxmlformats.org/markup-compatibility/2006" xmlns:a14="http://schemas.microsoft.com/office/drawing/2010/main">
+        <mc:Choice Requires="a14">
           <p:sp>
             <p:nvSpPr>
               <p:cNvPr id="3" name="Content Placeholder 2">
@@ -7525,7 +7535,7 @@
             </p:txBody>
           </p:sp>
         </mc:Choice>
-        <mc:Fallback>
+        <mc:Fallback xmlns="">
           <p:sp>
             <p:nvSpPr>
               <p:cNvPr id="3" name="Content Placeholder 2">
@@ -7640,8 +7650,8 @@
           <a:chExt cx="0" cy="0"/>
         </a:xfrm>
       </p:grpSpPr>
-      <mc:AlternateContent xmlns:mc="http://schemas.openxmlformats.org/markup-compatibility/2006">
-        <mc:Choice xmlns:a14="http://schemas.microsoft.com/office/drawing/2010/main" Requires="a14">
+      <mc:AlternateContent xmlns:mc="http://schemas.openxmlformats.org/markup-compatibility/2006" xmlns:a14="http://schemas.microsoft.com/office/drawing/2010/main">
+        <mc:Choice Requires="a14">
           <p:sp>
             <p:nvSpPr>
               <p:cNvPr id="5" name="Content Placeholder 2">
@@ -8206,7 +8216,7 @@
             </p:txBody>
           </p:sp>
         </mc:Choice>
-        <mc:Fallback>
+        <mc:Fallback xmlns="">
           <p:sp>
             <p:nvSpPr>
               <p:cNvPr id="5" name="Content Placeholder 2">
@@ -8332,8 +8342,8 @@
           <a:chExt cx="0" cy="0"/>
         </a:xfrm>
       </p:grpSpPr>
-      <mc:AlternateContent xmlns:mc="http://schemas.openxmlformats.org/markup-compatibility/2006">
-        <mc:Choice xmlns:a14="http://schemas.microsoft.com/office/drawing/2010/main" Requires="a14">
+      <mc:AlternateContent xmlns:mc="http://schemas.openxmlformats.org/markup-compatibility/2006" xmlns:a14="http://schemas.microsoft.com/office/drawing/2010/main">
+        <mc:Choice Requires="a14">
           <p:sp>
             <p:nvSpPr>
               <p:cNvPr id="8" name="Content Placeholder 2">
@@ -9119,7 +9129,7 @@
             </p:txBody>
           </p:sp>
         </mc:Choice>
-        <mc:Fallback>
+        <mc:Fallback xmlns="">
           <p:sp>
             <p:nvSpPr>
               <p:cNvPr id="8" name="Content Placeholder 2">
@@ -9216,8 +9226,8 @@
           </a:p>
         </p:txBody>
       </p:sp>
-      <mc:AlternateContent xmlns:mc="http://schemas.openxmlformats.org/markup-compatibility/2006">
-        <mc:Choice xmlns:a14="http://schemas.microsoft.com/office/drawing/2010/main" Requires="a14">
+      <mc:AlternateContent xmlns:mc="http://schemas.openxmlformats.org/markup-compatibility/2006" xmlns:a14="http://schemas.microsoft.com/office/drawing/2010/main">
+        <mc:Choice Requires="a14">
           <p:sp>
             <p:nvSpPr>
               <p:cNvPr id="10" name="Content Placeholder 2">
@@ -9994,7 +10004,7 @@
             </p:txBody>
           </p:sp>
         </mc:Choice>
-        <mc:Fallback>
+        <mc:Fallback xmlns="">
           <p:sp>
             <p:nvSpPr>
               <p:cNvPr id="10" name="Content Placeholder 2">

</xml_diff>